<commit_message>
updated new logo, now use new logo in index
</commit_message>
<xml_diff>
--- a/img/llc-logo.pptx
+++ b/img/llc-logo.pptx
@@ -105,6 +105,11 @@
       </a:defRPr>
     </a:lvl9pPr>
   </p:defaultTextStyle>
+  <p:extLst>
+    <p:ext uri="{EFAFB233-063F-42B5-8137-9DF3F51BA10A}">
+      <p15:sldGuideLst xmlns:p15="http://schemas.microsoft.com/office/powerpoint/2012/main"/>
+    </p:ext>
+  </p:extLst>
 </p:presentation>
 </file>
 
@@ -3098,8 +3103,8 @@
         </p:nvSpPr>
         <p:spPr>
           <a:xfrm>
-            <a:off x="0" y="320218"/>
-            <a:ext cx="10058399" cy="9417963"/>
+            <a:off x="850900" y="853618"/>
+            <a:ext cx="8356600" cy="7848302"/>
           </a:xfrm>
           <a:prstGeom prst="rect">
             <a:avLst/>
@@ -3117,7 +3122,7 @@
           <a:lstStyle/>
           <a:p>
             <a:r>
-              <a:rPr lang="en-US" sz="20200" b="1" dirty="0">
+              <a:rPr lang="en-US" sz="16800" b="1" dirty="0">
                 <a:ln w="12700">
                   <a:solidFill>
                     <a:schemeClr val="tx2">
@@ -3149,7 +3154,7 @@
               <a:t>L</a:t>
             </a:r>
             <a:r>
-              <a:rPr lang="en-US" sz="14000" b="1" dirty="0">
+              <a:rPr lang="en-US" sz="11700" b="1" dirty="0">
                 <a:ln w="12700">
                   <a:solidFill>
                     <a:schemeClr val="tx2">
@@ -3181,7 +3186,7 @@
               <a:t>AB for </a:t>
             </a:r>
             <a:br>
-              <a:rPr lang="en-US" sz="14000" b="1" dirty="0">
+              <a:rPr lang="en-US" sz="11700" b="1" dirty="0">
                 <a:ln w="12700">
                   <a:solidFill>
                     <a:schemeClr val="tx2">
@@ -3212,7 +3217,7 @@
               </a:rPr>
             </a:br>
             <a:r>
-              <a:rPr lang="en-US" sz="20200" b="1" dirty="0">
+              <a:rPr lang="en-US" sz="16800" b="1" dirty="0">
                 <a:ln w="12700">
                   <a:solidFill>
                     <a:schemeClr val="tx2">
@@ -3244,7 +3249,7 @@
               <a:t>L</a:t>
             </a:r>
             <a:r>
-              <a:rPr lang="en-US" sz="14000" b="1" dirty="0">
+              <a:rPr lang="en-US" sz="11700" b="1" dirty="0">
                 <a:ln w="12700">
                   <a:solidFill>
                     <a:schemeClr val="tx2">
@@ -3276,7 +3281,7 @@
               <a:t>INGUISTICS  &amp; </a:t>
             </a:r>
             <a:br>
-              <a:rPr lang="en-US" sz="14000" b="1" dirty="0">
+              <a:rPr lang="en-US" sz="11700" b="1" dirty="0">
                 <a:ln w="12700">
                   <a:solidFill>
                     <a:schemeClr val="tx2">
@@ -3307,7 +3312,7 @@
               </a:rPr>
             </a:br>
             <a:r>
-              <a:rPr lang="en-US" sz="20200" b="1" dirty="0">
+              <a:rPr lang="en-US" sz="16800" b="1" dirty="0">
                 <a:ln w="12700">
                   <a:solidFill>
                     <a:schemeClr val="tx2">
@@ -3339,7 +3344,7 @@
               <a:t>C</a:t>
             </a:r>
             <a:r>
-              <a:rPr lang="en-US" sz="14000" b="1" dirty="0">
+              <a:rPr lang="en-US" sz="11700" b="1" dirty="0">
                 <a:ln w="12700">
                   <a:solidFill>
                     <a:schemeClr val="tx2">

</xml_diff>